<commit_message>
Added static local functions
</commit_message>
<xml_diff>
--- a/Whats new in C#8.pptx
+++ b/Whats new in C#8.pptx
@@ -5,7 +5,7 @@
     <p:sldMasterId id="2147483656" r:id="rId1"/>
   </p:sldMasterIdLst>
   <p:notesMasterIdLst>
-    <p:notesMasterId r:id="rId31"/>
+    <p:notesMasterId r:id="rId32"/>
   </p:notesMasterIdLst>
   <p:sldIdLst>
     <p:sldId id="256" r:id="rId2"/>
@@ -34,9 +34,10 @@
     <p:sldId id="502" r:id="rId25"/>
     <p:sldId id="503" r:id="rId26"/>
     <p:sldId id="504" r:id="rId27"/>
-    <p:sldId id="492" r:id="rId28"/>
-    <p:sldId id="493" r:id="rId29"/>
-    <p:sldId id="420" r:id="rId30"/>
+    <p:sldId id="505" r:id="rId28"/>
+    <p:sldId id="506" r:id="rId29"/>
+    <p:sldId id="507" r:id="rId30"/>
+    <p:sldId id="420" r:id="rId31"/>
   </p:sldIdLst>
   <p:sldSz cx="12192000" cy="6858000"/>
   <p:notesSz cx="6858000" cy="9144000"/>
@@ -32195,7 +32196,7 @@
           <a:p>
             <a:fld id="{EB783297-46F3-4FED-9BE0-1B045AC356CA}" type="datetimeFigureOut">
               <a:rPr lang="en-US" smtClean="0"/>
-              <a:t>4/12/2019</a:t>
+              <a:t>4/15/2019</a:t>
             </a:fld>
             <a:endParaRPr lang="en-US"/>
           </a:p>
@@ -33952,7 +33953,7 @@
             <a:fld id="{8BF335F8-0389-41BF-A16B-EDE4EFDBE832}" type="slidenum">
               <a:rPr lang="en-US" smtClean="0"/>
               <a:pPr/>
-              <a:t>29</a:t>
+              <a:t>30</a:t>
             </a:fld>
             <a:endParaRPr lang="en-US" dirty="0"/>
           </a:p>
@@ -34767,7 +34768,7 @@
                 </a:solidFill>
                 <a:latin typeface="Arial Narrow" panose="020B0606020202030204" pitchFamily="34" charset="0"/>
               </a:rPr>
-              <a:t>Mark Reynolds</a:t>
+              <a:t>Joseph Reynolds</a:t>
             </a:r>
           </a:p>
         </p:txBody>
@@ -34787,7 +34788,7 @@
         <p:spPr>
           <a:xfrm>
             <a:off x="1463040" y="3291840"/>
-            <a:ext cx="6715027" cy="954107"/>
+            <a:ext cx="6715027" cy="677108"/>
           </a:xfrm>
           <a:prstGeom prst="rect">
             <a:avLst/>
@@ -34807,7 +34808,7 @@
                 </a:solidFill>
                 <a:latin typeface="Trebuchet MS" panose="020B0603020202020204" pitchFamily="34" charset="0"/>
               </a:rPr>
-              <a:t>Mark Reynolds</a:t>
+              <a:t>Joseph Reynolds</a:t>
             </a:r>
             <a:br>
               <a:rPr lang="en-US" sz="2000" spc="100" baseline="0" dirty="0">
@@ -34824,28 +34825,17 @@
                 </a:solidFill>
                 <a:latin typeface="Trebuchet MS" panose="020B0603020202020204" pitchFamily="34" charset="0"/>
               </a:rPr>
-              <a:t>Digital Transformation &amp; Data Driven Solutions</a:t>
-            </a:r>
-          </a:p>
-          <a:p>
-            <a:r>
-              <a:rPr lang="en-US" dirty="0">
-                <a:solidFill>
-                  <a:srgbClr val="003760"/>
-                </a:solidFill>
-                <a:latin typeface="Trebuchet MS" panose="020B0603020202020204" pitchFamily="34" charset="0"/>
-              </a:rPr>
-              <a:t>Principal Architect / Systems Engineer</a:t>
+              <a:t>Software and DevOps Engineer</a:t>
             </a:r>
           </a:p>
         </p:txBody>
       </p:sp>
       <p:pic>
         <p:nvPicPr>
-          <p:cNvPr id="24" name="Picture 23">
+          <p:cNvPr id="5" name="Picture 4">
             <a:extLst>
               <a:ext uri="{FF2B5EF4-FFF2-40B4-BE49-F238E27FC236}">
-                <a16:creationId xmlns:a16="http://schemas.microsoft.com/office/drawing/2014/main" id="{14582B11-42AB-4215-8DA9-EC708CAC222E}"/>
+                <a16:creationId xmlns:a16="http://schemas.microsoft.com/office/drawing/2014/main" id="{41136949-0218-413A-A61A-B4ECD92AA9D6}"/>
               </a:ext>
             </a:extLst>
           </p:cNvPr>
@@ -34854,21 +34844,22 @@
           </p:cNvPicPr>
           <p:nvPr userDrawn="1"/>
         </p:nvPicPr>
-        <p:blipFill rotWithShape="1">
-          <a:blip r:embed="rId3" cstate="print">
+        <p:blipFill>
+          <a:blip r:embed="rId4">
             <a:extLst>
               <a:ext uri="{28A0092B-C50C-407E-A947-70E740481C1C}">
                 <a14:useLocalDpi xmlns:a14="http://schemas.microsoft.com/office/drawing/2010/main" val="0"/>
               </a:ext>
             </a:extLst>
           </a:blip>
-          <a:srcRect t="-1" b="410"/>
-          <a:stretch/>
+          <a:stretch>
+            <a:fillRect/>
+          </a:stretch>
         </p:blipFill>
         <p:spPr>
           <a:xfrm>
-            <a:off x="8116210" y="1584587"/>
-            <a:ext cx="3145536" cy="3915783"/>
+            <a:off x="7324531" y="1579563"/>
+            <a:ext cx="3937215" cy="3937215"/>
           </a:xfrm>
           <a:prstGeom prst="rect">
             <a:avLst/>
@@ -35019,7 +35010,7 @@
           <a:p>
             <a:fld id="{9F6101A7-E51F-4B39-AD55-E734EB96B90F}" type="datetime1">
               <a:rPr lang="en-US" smtClean="0"/>
-              <a:t>4/12/2019</a:t>
+              <a:t>4/15/2019</a:t>
             </a:fld>
             <a:endParaRPr lang="en-US"/>
           </a:p>
@@ -35298,7 +35289,7 @@
           <a:p>
             <a:fld id="{53BB87A3-CF58-4396-AC80-EF7FD2F0A808}" type="datetime1">
               <a:rPr lang="en-US" smtClean="0"/>
-              <a:t>4/12/2019</a:t>
+              <a:t>4/15/2019</a:t>
             </a:fld>
             <a:endParaRPr lang="en-US"/>
           </a:p>
@@ -35568,7 +35559,7 @@
           <a:p>
             <a:fld id="{3C0F3998-EB5F-4120-A251-20ACC220CAF3}" type="datetime1">
               <a:rPr lang="en-US" smtClean="0"/>
-              <a:t>4/12/2019</a:t>
+              <a:t>4/15/2019</a:t>
             </a:fld>
             <a:endParaRPr lang="en-US"/>
           </a:p>
@@ -35984,7 +35975,7 @@
           <a:p>
             <a:fld id="{9CCE1485-EC4B-4749-B309-CEA85AA8092E}" type="datetime1">
               <a:rPr lang="en-US" smtClean="0"/>
-              <a:t>4/12/2019</a:t>
+              <a:t>4/15/2019</a:t>
             </a:fld>
             <a:endParaRPr lang="en-US"/>
           </a:p>
@@ -36129,7 +36120,7 @@
           <a:p>
             <a:fld id="{2EEC1184-0BD5-4A04-977F-29FFA74BECF8}" type="datetime1">
               <a:rPr lang="en-US" smtClean="0"/>
-              <a:t>4/12/2019</a:t>
+              <a:t>4/15/2019</a:t>
             </a:fld>
             <a:endParaRPr lang="en-US"/>
           </a:p>
@@ -36246,7 +36237,7 @@
           <a:p>
             <a:fld id="{2B89BADD-0649-4523-9CE4-33D5001F577C}" type="datetime1">
               <a:rPr lang="en-US" smtClean="0"/>
-              <a:t>4/12/2019</a:t>
+              <a:t>4/15/2019</a:t>
             </a:fld>
             <a:endParaRPr lang="en-US"/>
           </a:p>
@@ -36492,7 +36483,7 @@
           <a:p>
             <a:fld id="{677BCB15-B53A-49ED-A65B-90E3BB7A8DF4}" type="datetime1">
               <a:rPr lang="en-US" smtClean="0"/>
-              <a:t>4/12/2019</a:t>
+              <a:t>4/15/2019</a:t>
             </a:fld>
             <a:endParaRPr lang="en-US" dirty="0"/>
           </a:p>
@@ -36539,7 +36530,7 @@
           <a:p>
             <a:r>
               <a:rPr lang="en-US" dirty="0"/>
-              <a:t>Copyright © 2013 - 2019 by Mark Reynolds</a:t>
+              <a:t>Copyright © 2013 - 2019 by Joseph Reynolds</a:t>
             </a:r>
           </a:p>
         </p:txBody>
@@ -36729,42 +36720,6 @@
           </a:fontRef>
         </p:style>
       </p:cxnSp>
-      <p:pic>
-        <p:nvPicPr>
-          <p:cNvPr id="10" name="Picture 9">
-            <a:extLst>
-              <a:ext uri="{FF2B5EF4-FFF2-40B4-BE49-F238E27FC236}">
-                <a16:creationId xmlns:a16="http://schemas.microsoft.com/office/drawing/2014/main" id="{722B70A4-E076-418D-B968-629DB2778435}"/>
-              </a:ext>
-            </a:extLst>
-          </p:cNvPr>
-          <p:cNvPicPr>
-            <a:picLocks noChangeAspect="1"/>
-          </p:cNvPicPr>
-          <p:nvPr/>
-        </p:nvPicPr>
-        <p:blipFill>
-          <a:blip r:embed="rId9">
-            <a:extLst>
-              <a:ext uri="{28A0092B-C50C-407E-A947-70E740481C1C}">
-                <a14:useLocalDpi xmlns:a14="http://schemas.microsoft.com/office/drawing/2010/main" val="0"/>
-              </a:ext>
-            </a:extLst>
-          </a:blip>
-          <a:stretch>
-            <a:fillRect/>
-          </a:stretch>
-        </p:blipFill>
-        <p:spPr>
-          <a:xfrm>
-            <a:off x="10360152" y="6458928"/>
-            <a:ext cx="1809524" cy="400000"/>
-          </a:xfrm>
-          <a:prstGeom prst="rect">
-            <a:avLst/>
-          </a:prstGeom>
-        </p:spPr>
-      </p:pic>
       <p:sp>
         <p:nvSpPr>
           <p:cNvPr id="11" name="Rectangle 10">
@@ -36903,6 +36858,42 @@
           </a:fontRef>
         </p:style>
       </p:cxnSp>
+      <p:pic>
+        <p:nvPicPr>
+          <p:cNvPr id="15" name="Picture 14">
+            <a:extLst>
+              <a:ext uri="{FF2B5EF4-FFF2-40B4-BE49-F238E27FC236}">
+                <a16:creationId xmlns:a16="http://schemas.microsoft.com/office/drawing/2014/main" id="{F10C1E66-E7BF-4D55-AEC2-9614AE9CECE4}"/>
+              </a:ext>
+            </a:extLst>
+          </p:cNvPr>
+          <p:cNvPicPr>
+            <a:picLocks noChangeAspect="1"/>
+          </p:cNvPicPr>
+          <p:nvPr userDrawn="1"/>
+        </p:nvPicPr>
+        <p:blipFill>
+          <a:blip r:embed="rId9">
+            <a:extLst>
+              <a:ext uri="{28A0092B-C50C-407E-A947-70E740481C1C}">
+                <a14:useLocalDpi xmlns:a14="http://schemas.microsoft.com/office/drawing/2010/main" val="0"/>
+              </a:ext>
+            </a:extLst>
+          </a:blip>
+          <a:stretch>
+            <a:fillRect/>
+          </a:stretch>
+        </p:blipFill>
+        <p:spPr>
+          <a:xfrm>
+            <a:off x="10515601" y="5181601"/>
+            <a:ext cx="1676400" cy="1676400"/>
+          </a:xfrm>
+          <a:prstGeom prst="rect">
+            <a:avLst/>
+          </a:prstGeom>
+        </p:spPr>
+      </p:pic>
     </p:spTree>
     <p:extLst>
       <p:ext uri="{BB962C8B-B14F-4D97-AF65-F5344CB8AC3E}">
@@ -37302,7 +37293,7 @@
           <a:p>
             <a:r>
               <a:rPr lang="en-US" dirty="0"/>
-              <a:t>Mark Reynolds</a:t>
+              <a:t>Joseph Reynolds</a:t>
             </a:r>
           </a:p>
           <a:p>
@@ -40544,10 +40535,10 @@
       </p:grpSpPr>
       <p:sp>
         <p:nvSpPr>
-          <p:cNvPr id="6" name="Title 5">
+          <p:cNvPr id="2" name="Title 1">
             <a:extLst>
               <a:ext uri="{FF2B5EF4-FFF2-40B4-BE49-F238E27FC236}">
-                <a16:creationId xmlns:a16="http://schemas.microsoft.com/office/drawing/2014/main" id="{ABE0E0F1-BB7B-4663-B898-D18A9B1DAB0B}"/>
+                <a16:creationId xmlns:a16="http://schemas.microsoft.com/office/drawing/2014/main" id="{16278CC4-B989-42AC-A34B-83C20792CAC5}"/>
               </a:ext>
             </a:extLst>
           </p:cNvPr>
@@ -40565,17 +40556,17 @@
           <a:p>
             <a:r>
               <a:rPr lang="en-US" dirty="0"/>
-              <a:t>Records</a:t>
+              <a:t>Static Local Functions</a:t>
             </a:r>
           </a:p>
         </p:txBody>
       </p:sp>
       <p:sp>
         <p:nvSpPr>
-          <p:cNvPr id="7" name="Text Placeholder 6">
+          <p:cNvPr id="3" name="Text Placeholder 2">
             <a:extLst>
               <a:ext uri="{FF2B5EF4-FFF2-40B4-BE49-F238E27FC236}">
-                <a16:creationId xmlns:a16="http://schemas.microsoft.com/office/drawing/2014/main" id="{3916102F-C4BB-4B5F-8A6F-B70012CFFC77}"/>
+                <a16:creationId xmlns:a16="http://schemas.microsoft.com/office/drawing/2014/main" id="{C5D0C9A7-8270-4396-AFDA-57A1959C41A5}"/>
               </a:ext>
             </a:extLst>
           </p:cNvPr>
@@ -40591,13 +40582,7 @@
           <a:bodyPr/>
           <a:lstStyle/>
           <a:p>
-            <a:r>
-              <a:rPr lang="en-US" dirty="0">
-                <a:hlinkClick r:id="rId2"/>
-              </a:rPr>
-              <a:t>https://github.com/dotnet/csharplang/blob/master/proposals/records.md</a:t>
-            </a:r>
-            <a:endParaRPr lang="en-US" dirty="0"/>
+            <a:endParaRPr lang="en-US"/>
           </a:p>
         </p:txBody>
       </p:sp>
@@ -40606,7 +40591,7 @@
           <p:cNvPr id="4" name="Footer Placeholder 3">
             <a:extLst>
               <a:ext uri="{FF2B5EF4-FFF2-40B4-BE49-F238E27FC236}">
-                <a16:creationId xmlns:a16="http://schemas.microsoft.com/office/drawing/2014/main" id="{B9C64600-9B39-41AA-AAA8-5BA4C14DA12F}"/>
+                <a16:creationId xmlns:a16="http://schemas.microsoft.com/office/drawing/2014/main" id="{7DFB85AD-F56E-46A1-9B9B-E01EECDFB9D4}"/>
               </a:ext>
             </a:extLst>
           </p:cNvPr>
@@ -40635,7 +40620,7 @@
           <p:cNvPr id="5" name="Slide Number Placeholder 4">
             <a:extLst>
               <a:ext uri="{FF2B5EF4-FFF2-40B4-BE49-F238E27FC236}">
-                <a16:creationId xmlns:a16="http://schemas.microsoft.com/office/drawing/2014/main" id="{12B6CC00-5D01-4132-A394-5F2595A83652}"/>
+                <a16:creationId xmlns:a16="http://schemas.microsoft.com/office/drawing/2014/main" id="{51FC1D70-0096-4E76-9619-3A7E028A523B}"/>
               </a:ext>
             </a:extLst>
           </p:cNvPr>
@@ -40662,7 +40647,7 @@
     </p:spTree>
     <p:extLst>
       <p:ext uri="{BB962C8B-B14F-4D97-AF65-F5344CB8AC3E}">
-        <p14:creationId xmlns:p14="http://schemas.microsoft.com/office/powerpoint/2010/main" val="2853629360"/>
+        <p14:creationId xmlns:p14="http://schemas.microsoft.com/office/powerpoint/2010/main" val="1832897769"/>
       </p:ext>
     </p:extLst>
   </p:cSld>
@@ -40694,7 +40679,7 @@
           <p:cNvPr id="2" name="Title 1">
             <a:extLst>
               <a:ext uri="{FF2B5EF4-FFF2-40B4-BE49-F238E27FC236}">
-                <a16:creationId xmlns:a16="http://schemas.microsoft.com/office/drawing/2014/main" id="{2D1181A1-86A5-46D3-BB06-A1047EBBBE0A}"/>
+                <a16:creationId xmlns:a16="http://schemas.microsoft.com/office/drawing/2014/main" id="{C068A052-D22E-486B-ABA8-1608C34E845B}"/>
               </a:ext>
             </a:extLst>
           </p:cNvPr>
@@ -40714,46 +40699,44 @@
           </a:p>
         </p:txBody>
       </p:sp>
-      <p:sp>
-        <p:nvSpPr>
-          <p:cNvPr id="3" name="Content Placeholder 2">
+      <p:pic>
+        <p:nvPicPr>
+          <p:cNvPr id="6" name="Content Placeholder 5">
             <a:extLst>
               <a:ext uri="{FF2B5EF4-FFF2-40B4-BE49-F238E27FC236}">
-                <a16:creationId xmlns:a16="http://schemas.microsoft.com/office/drawing/2014/main" id="{D05D395E-8F59-47A7-BD57-A5C091BC5D51}"/>
+                <a16:creationId xmlns:a16="http://schemas.microsoft.com/office/drawing/2014/main" id="{AACCFCCE-BB46-4B15-95BB-DBC1290A5C6A}"/>
               </a:ext>
             </a:extLst>
           </p:cNvPr>
-          <p:cNvSpPr>
-            <a:spLocks noGrp="1"/>
-          </p:cNvSpPr>
+          <p:cNvPicPr>
+            <a:picLocks noGrp="1" noChangeAspect="1"/>
+          </p:cNvPicPr>
           <p:nvPr>
             <p:ph idx="1"/>
           </p:nvPr>
-        </p:nvSpPr>
-        <p:spPr/>
-        <p:txBody>
-          <a:bodyPr/>
-          <a:lstStyle/>
-          <a:p>
-            <a:r>
-              <a:rPr lang="en-US" dirty="0"/>
-              <a:t>Records are a way to create very lightweight classes that are just a collection of fields (POCO)</a:t>
-            </a:r>
-          </a:p>
-          <a:p>
-            <a:r>
-              <a:rPr lang="en-US" dirty="0"/>
-              <a:t>The Records syntax should allow implementation of these classes and structs with absolute minimum code</a:t>
-            </a:r>
-          </a:p>
-        </p:txBody>
-      </p:sp>
+        </p:nvPicPr>
+        <p:blipFill>
+          <a:blip r:embed="rId2"/>
+          <a:stretch>
+            <a:fillRect/>
+          </a:stretch>
+        </p:blipFill>
+        <p:spPr>
+          <a:xfrm>
+            <a:off x="3175365" y="2800485"/>
+            <a:ext cx="5847619" cy="2171429"/>
+          </a:xfrm>
+          <a:prstGeom prst="rect">
+            <a:avLst/>
+          </a:prstGeom>
+        </p:spPr>
+      </p:pic>
       <p:sp>
         <p:nvSpPr>
           <p:cNvPr id="4" name="Footer Placeholder 3">
             <a:extLst>
               <a:ext uri="{FF2B5EF4-FFF2-40B4-BE49-F238E27FC236}">
-                <a16:creationId xmlns:a16="http://schemas.microsoft.com/office/drawing/2014/main" id="{019D26EA-69FE-4695-8B0A-CE9ED11CC371}"/>
+                <a16:creationId xmlns:a16="http://schemas.microsoft.com/office/drawing/2014/main" id="{1884A606-96DC-4FF3-9216-6C95FAE8801C}"/>
               </a:ext>
             </a:extLst>
           </p:cNvPr>
@@ -40782,7 +40765,7 @@
           <p:cNvPr id="5" name="Slide Number Placeholder 4">
             <a:extLst>
               <a:ext uri="{FF2B5EF4-FFF2-40B4-BE49-F238E27FC236}">
-                <a16:creationId xmlns:a16="http://schemas.microsoft.com/office/drawing/2014/main" id="{ACA11E49-54B3-4C0C-B0CA-5FBA1020D4C2}"/>
+                <a16:creationId xmlns:a16="http://schemas.microsoft.com/office/drawing/2014/main" id="{308B7509-FFAB-4EF2-8D74-74FF8718220E}"/>
               </a:ext>
             </a:extLst>
           </p:cNvPr>
@@ -40809,7 +40792,7 @@
     </p:spTree>
     <p:extLst>
       <p:ext uri="{BB962C8B-B14F-4D97-AF65-F5344CB8AC3E}">
-        <p14:creationId xmlns:p14="http://schemas.microsoft.com/office/powerpoint/2010/main" val="484189932"/>
+        <p14:creationId xmlns:p14="http://schemas.microsoft.com/office/powerpoint/2010/main" val="831650211"/>
       </p:ext>
     </p:extLst>
   </p:cSld>
@@ -40838,9 +40821,15 @@
       </p:grpSpPr>
       <p:sp>
         <p:nvSpPr>
-          <p:cNvPr id="4099" name="Rectangle 2"/>
+          <p:cNvPr id="2" name="Title 1">
+            <a:extLst>
+              <a:ext uri="{FF2B5EF4-FFF2-40B4-BE49-F238E27FC236}">
+                <a16:creationId xmlns:a16="http://schemas.microsoft.com/office/drawing/2014/main" id="{86B4DF31-2ED1-4DA1-9EDC-63F74A210E62}"/>
+              </a:ext>
+            </a:extLst>
+          </p:cNvPr>
           <p:cNvSpPr>
-            <a:spLocks noGrp="1" noChangeArrowheads="1"/>
+            <a:spLocks noGrp="1"/>
           </p:cNvSpPr>
           <p:nvPr>
             <p:ph type="title"/>
@@ -40851,303 +40840,51 @@
           <a:bodyPr/>
           <a:lstStyle/>
           <a:p>
-            <a:r>
-              <a:rPr lang="en-US" dirty="0">
-                <a:latin typeface="+mn-lt"/>
-              </a:rPr>
-              <a:t>Mark Reynolds</a:t>
-            </a:r>
+            <a:endParaRPr lang="en-US"/>
           </a:p>
         </p:txBody>
       </p:sp>
+      <p:pic>
+        <p:nvPicPr>
+          <p:cNvPr id="6" name="Content Placeholder 5">
+            <a:extLst>
+              <a:ext uri="{FF2B5EF4-FFF2-40B4-BE49-F238E27FC236}">
+                <a16:creationId xmlns:a16="http://schemas.microsoft.com/office/drawing/2014/main" id="{131057E1-B0B8-4951-B681-D97CE6473818}"/>
+              </a:ext>
+            </a:extLst>
+          </p:cNvPr>
+          <p:cNvPicPr>
+            <a:picLocks noGrp="1" noChangeAspect="1"/>
+          </p:cNvPicPr>
+          <p:nvPr>
+            <p:ph idx="1"/>
+          </p:nvPr>
+        </p:nvPicPr>
+        <p:blipFill>
+          <a:blip r:embed="rId2"/>
+          <a:stretch>
+            <a:fillRect/>
+          </a:stretch>
+        </p:blipFill>
+        <p:spPr>
+          <a:xfrm>
+            <a:off x="3037270" y="2752866"/>
+            <a:ext cx="6123809" cy="2266667"/>
+          </a:xfrm>
+          <a:prstGeom prst="rect">
+            <a:avLst/>
+          </a:prstGeom>
+        </p:spPr>
+      </p:pic>
       <p:sp>
         <p:nvSpPr>
-          <p:cNvPr id="6" name="Content Placeholder 5"/>
-          <p:cNvSpPr>
-            <a:spLocks noGrp="1"/>
-          </p:cNvSpPr>
-          <p:nvPr>
-            <p:ph sz="half" idx="1"/>
-          </p:nvPr>
-        </p:nvSpPr>
-        <p:spPr>
-          <a:xfrm>
-            <a:off x="4066560" y="1072115"/>
-            <a:ext cx="4038600" cy="4846320"/>
-          </a:xfrm>
-        </p:spPr>
-        <p:txBody>
-          <a:bodyPr>
-            <a:normAutofit lnSpcReduction="10000"/>
-          </a:bodyPr>
-          <a:lstStyle/>
-          <a:p>
-            <a:pPr>
-              <a:buNone/>
-            </a:pPr>
-            <a:r>
-              <a:rPr lang="en-US" dirty="0">
-                <a:solidFill>
-                  <a:schemeClr val="tx1">
-                    <a:lumMod val="85000"/>
-                    <a:lumOff val="15000"/>
-                  </a:schemeClr>
-                </a:solidFill>
-              </a:rPr>
-              <a:t>Mark Reynolds Vitae</a:t>
-            </a:r>
-          </a:p>
-          <a:p>
-            <a:r>
-              <a:rPr lang="en-US" sz="2000" dirty="0">
-                <a:solidFill>
-                  <a:schemeClr val="tx1">
-                    <a:lumMod val="85000"/>
-                    <a:lumOff val="15000"/>
-                  </a:schemeClr>
-                </a:solidFill>
-              </a:rPr>
-              <a:t>Southwestern Energy</a:t>
-            </a:r>
-          </a:p>
-          <a:p>
-            <a:r>
-              <a:rPr lang="en-US" sz="2000" dirty="0">
-                <a:solidFill>
-                  <a:schemeClr val="tx1">
-                    <a:lumMod val="85000"/>
-                    <a:lumOff val="15000"/>
-                  </a:schemeClr>
-                </a:solidFill>
-              </a:rPr>
-              <a:t>Lone Star College</a:t>
-            </a:r>
-          </a:p>
-          <a:p>
-            <a:r>
-              <a:rPr lang="en-US" sz="2000" dirty="0">
-                <a:solidFill>
-                  <a:schemeClr val="tx1">
-                    <a:lumMod val="85000"/>
-                    <a:lumOff val="15000"/>
-                  </a:schemeClr>
-                </a:solidFill>
-              </a:rPr>
-              <a:t>Intent Driven Designs</a:t>
-            </a:r>
-          </a:p>
-          <a:p>
-            <a:r>
-              <a:rPr lang="en-US" sz="2000" dirty="0">
-                <a:solidFill>
-                  <a:schemeClr val="tx1">
-                    <a:lumMod val="85000"/>
-                    <a:lumOff val="15000"/>
-                  </a:schemeClr>
-                </a:solidFill>
-              </a:rPr>
-              <a:t>Scan Systems</a:t>
-            </a:r>
-          </a:p>
-          <a:p>
-            <a:r>
-              <a:rPr lang="en-US" sz="2000" dirty="0">
-                <a:solidFill>
-                  <a:schemeClr val="tx1">
-                    <a:lumMod val="85000"/>
-                    <a:lumOff val="15000"/>
-                  </a:schemeClr>
-                </a:solidFill>
-              </a:rPr>
-              <a:t>Sikorsky Aircraft</a:t>
-            </a:r>
-          </a:p>
-          <a:p>
-            <a:r>
-              <a:rPr lang="en-US" sz="2000" dirty="0">
-                <a:solidFill>
-                  <a:schemeClr val="tx1">
-                    <a:lumMod val="85000"/>
-                    <a:lumOff val="15000"/>
-                  </a:schemeClr>
-                </a:solidFill>
-              </a:rPr>
-              <a:t>General Dynamics</a:t>
-            </a:r>
-          </a:p>
-        </p:txBody>
-      </p:sp>
-      <p:sp>
-        <p:nvSpPr>
-          <p:cNvPr id="8" name="Content Placeholder 7"/>
-          <p:cNvSpPr>
-            <a:spLocks noGrp="1"/>
-          </p:cNvSpPr>
-          <p:nvPr>
-            <p:ph sz="half" idx="2"/>
-          </p:nvPr>
-        </p:nvSpPr>
-        <p:spPr>
-          <a:xfrm>
-            <a:off x="4136664" y="3668471"/>
-            <a:ext cx="6044284" cy="1875225"/>
-          </a:xfrm>
-        </p:spPr>
-        <p:txBody>
-          <a:bodyPr>
-            <a:normAutofit lnSpcReduction="10000"/>
-          </a:bodyPr>
-          <a:lstStyle/>
-          <a:p>
-            <a:endParaRPr lang="en-US" dirty="0"/>
-          </a:p>
-          <a:p>
-            <a:pPr marL="0" indent="0">
-              <a:buNone/>
-            </a:pPr>
-            <a:r>
-              <a:rPr lang="en-US" sz="1800" dirty="0">
-                <a:solidFill>
-                  <a:schemeClr val="tx1">
-                    <a:lumMod val="85000"/>
-                    <a:lumOff val="15000"/>
-                  </a:schemeClr>
-                </a:solidFill>
-              </a:rPr>
-              <a:t>Personal Email</a:t>
-            </a:r>
-            <a:r>
-              <a:rPr lang="en-US" sz="1800" dirty="0"/>
-              <a:t>: </a:t>
-            </a:r>
-            <a:r>
-              <a:rPr lang="en-US" sz="1800" dirty="0" err="1">
-                <a:hlinkClick r:id="rId3"/>
-              </a:rPr>
-              <a:t>mark@DataDriven.Energy</a:t>
-            </a:r>
-            <a:r>
-              <a:rPr lang="en-US" sz="1800" dirty="0"/>
-              <a:t> </a:t>
-            </a:r>
-            <a:endParaRPr lang="en-US" sz="1800" dirty="0">
-              <a:solidFill>
-                <a:schemeClr val="tx1">
-                  <a:lumMod val="85000"/>
-                  <a:lumOff val="15000"/>
-                </a:schemeClr>
-              </a:solidFill>
-            </a:endParaRPr>
-          </a:p>
-          <a:p>
-            <a:pPr marL="0" indent="0">
-              <a:buNone/>
-            </a:pPr>
-            <a:r>
-              <a:rPr lang="en-US" sz="1800" dirty="0" err="1">
-                <a:solidFill>
-                  <a:schemeClr val="tx1">
-                    <a:lumMod val="85000"/>
-                    <a:lumOff val="15000"/>
-                  </a:schemeClr>
-                </a:solidFill>
-              </a:rPr>
-              <a:t>Linkedin</a:t>
-            </a:r>
-            <a:r>
-              <a:rPr lang="en-US" sz="1800" dirty="0">
-                <a:solidFill>
-                  <a:schemeClr val="tx1">
-                    <a:lumMod val="85000"/>
-                    <a:lumOff val="15000"/>
-                  </a:schemeClr>
-                </a:solidFill>
-              </a:rPr>
-              <a:t>: </a:t>
-            </a:r>
-            <a:r>
-              <a:rPr lang="en-US" sz="1800" dirty="0">
-                <a:solidFill>
-                  <a:schemeClr val="tx1">
-                    <a:lumMod val="85000"/>
-                    <a:lumOff val="15000"/>
-                  </a:schemeClr>
-                </a:solidFill>
-                <a:hlinkClick r:id="rId4"/>
-              </a:rPr>
-              <a:t>www.linkedin.com/in/MarkDataDriven</a:t>
-            </a:r>
-            <a:endParaRPr lang="en-US" sz="1800" dirty="0">
-              <a:solidFill>
-                <a:schemeClr val="tx1">
-                  <a:lumMod val="85000"/>
-                  <a:lumOff val="15000"/>
-                </a:schemeClr>
-              </a:solidFill>
-            </a:endParaRPr>
-          </a:p>
-          <a:p>
-            <a:pPr marL="0" indent="0">
-              <a:buNone/>
-            </a:pPr>
-            <a:r>
-              <a:rPr lang="en-US" sz="1800" dirty="0">
-                <a:solidFill>
-                  <a:schemeClr val="tx1">
-                    <a:lumMod val="85000"/>
-                    <a:lumOff val="15000"/>
-                  </a:schemeClr>
-                </a:solidFill>
-              </a:rPr>
-              <a:t>Twitter: @</a:t>
-            </a:r>
-            <a:r>
-              <a:rPr lang="en-US" sz="1800" dirty="0" err="1">
-                <a:solidFill>
-                  <a:schemeClr val="tx1">
-                    <a:lumMod val="85000"/>
-                    <a:lumOff val="15000"/>
-                  </a:schemeClr>
-                </a:solidFill>
-              </a:rPr>
-              <a:t>MarkDataDriven</a:t>
-            </a:r>
-            <a:endParaRPr lang="en-US" sz="1800" dirty="0">
-              <a:solidFill>
-                <a:schemeClr val="tx1">
-                  <a:lumMod val="85000"/>
-                  <a:lumOff val="15000"/>
-                </a:schemeClr>
-              </a:solidFill>
-            </a:endParaRPr>
-          </a:p>
-          <a:p>
-            <a:pPr marL="0" indent="0">
-              <a:buNone/>
-            </a:pPr>
-            <a:r>
-              <a:rPr lang="en-US" sz="1800" u="sng" dirty="0">
-                <a:solidFill>
-                  <a:srgbClr val="00A6DE"/>
-                </a:solidFill>
-                <a:hlinkClick r:id="rId5"/>
-              </a:rPr>
-              <a:t>http://DigitalTransformation.Engineer</a:t>
-            </a:r>
-            <a:endParaRPr lang="en-US" sz="1800" dirty="0">
-              <a:solidFill>
-                <a:schemeClr val="tx1">
-                  <a:lumMod val="85000"/>
-                  <a:lumOff val="15000"/>
-                </a:schemeClr>
-              </a:solidFill>
-            </a:endParaRPr>
-          </a:p>
-        </p:txBody>
-      </p:sp>
-      <p:sp>
-        <p:nvSpPr>
-          <p:cNvPr id="3" name="Footer Placeholder 2"/>
+          <p:cNvPr id="4" name="Footer Placeholder 3">
+            <a:extLst>
+              <a:ext uri="{FF2B5EF4-FFF2-40B4-BE49-F238E27FC236}">
+                <a16:creationId xmlns:a16="http://schemas.microsoft.com/office/drawing/2014/main" id="{6AC4FF11-B880-44A3-A58A-CDE566592081}"/>
+              </a:ext>
+            </a:extLst>
+          </p:cNvPr>
           <p:cNvSpPr>
             <a:spLocks noGrp="1"/>
           </p:cNvSpPr>
@@ -41155,12 +40892,7 @@
             <p:ph type="ftr" sz="quarter" idx="11"/>
           </p:nvPr>
         </p:nvSpPr>
-        <p:spPr>
-          <a:xfrm>
-            <a:off x="1828800" y="6547104"/>
-            <a:ext cx="8531352" cy="274320"/>
-          </a:xfrm>
-        </p:spPr>
+        <p:spPr/>
         <p:txBody>
           <a:bodyPr/>
           <a:lstStyle/>
@@ -41169,12 +40901,19 @@
               <a:rPr lang="en-US"/>
               <a:t>Copyright © 2013 - 2019 by Mark Reynolds</a:t>
             </a:r>
+            <a:endParaRPr lang="en-US" dirty="0"/>
           </a:p>
         </p:txBody>
       </p:sp>
       <p:sp>
         <p:nvSpPr>
-          <p:cNvPr id="4" name="Slide Number Placeholder 3"/>
+          <p:cNvPr id="5" name="Slide Number Placeholder 4">
+            <a:extLst>
+              <a:ext uri="{FF2B5EF4-FFF2-40B4-BE49-F238E27FC236}">
+                <a16:creationId xmlns:a16="http://schemas.microsoft.com/office/drawing/2014/main" id="{82DDC804-554F-40F9-8A9E-62F521A7ED38}"/>
+              </a:ext>
+            </a:extLst>
+          </p:cNvPr>
           <p:cNvSpPr>
             <a:spLocks noGrp="1"/>
           </p:cNvSpPr>
@@ -41195,58 +40934,16 @@
           </a:p>
         </p:txBody>
       </p:sp>
-      <p:pic>
-        <p:nvPicPr>
-          <p:cNvPr id="2" name="Picture 1"/>
-          <p:cNvPicPr>
-            <a:picLocks noChangeAspect="1"/>
-          </p:cNvPicPr>
-          <p:nvPr/>
-        </p:nvPicPr>
-        <p:blipFill>
-          <a:blip r:embed="rId6" cstate="print">
-            <a:extLst>
-              <a:ext uri="{28A0092B-C50C-407E-A947-70E740481C1C}">
-                <a14:useLocalDpi xmlns:a14="http://schemas.microsoft.com/office/drawing/2010/main" val="0"/>
-              </a:ext>
-            </a:extLst>
-          </a:blip>
-          <a:stretch>
-            <a:fillRect/>
-          </a:stretch>
-        </p:blipFill>
-        <p:spPr>
-          <a:xfrm>
-            <a:off x="0" y="1899786"/>
-            <a:ext cx="3657607" cy="4572009"/>
-          </a:xfrm>
-          <a:prstGeom prst="rect">
-            <a:avLst/>
-          </a:prstGeom>
-        </p:spPr>
-      </p:pic>
     </p:spTree>
     <p:extLst>
       <p:ext uri="{BB962C8B-B14F-4D97-AF65-F5344CB8AC3E}">
-        <p14:creationId xmlns:p14="http://schemas.microsoft.com/office/powerpoint/2010/main" val="3856311636"/>
+        <p14:creationId xmlns:p14="http://schemas.microsoft.com/office/powerpoint/2010/main" val="3405636962"/>
       </p:ext>
     </p:extLst>
   </p:cSld>
   <p:clrMapOvr>
     <a:masterClrMapping/>
   </p:clrMapOvr>
-  <mc:AlternateContent xmlns:mc="http://schemas.openxmlformats.org/markup-compatibility/2006" xmlns:p14="http://schemas.microsoft.com/office/powerpoint/2010/main">
-    <mc:Choice Requires="p14">
-      <p:transition spd="slow" p14:dur="1200">
-        <p14:prism/>
-      </p:transition>
-    </mc:Choice>
-    <mc:Fallback xmlns="">
-      <p:transition spd="slow">
-        <p:fade/>
-      </p:transition>
-    </mc:Fallback>
-  </mc:AlternateContent>
 </p:sld>
 </file>
 
@@ -41438,6 +41135,219 @@
   <p:clrMapOvr>
     <a:masterClrMapping/>
   </p:clrMapOvr>
+</p:sld>
+</file>
+
+<file path=ppt/slides/slide30.xml><?xml version="1.0" encoding="utf-8"?>
+<p:sld xmlns:a="http://schemas.openxmlformats.org/drawingml/2006/main" xmlns:r="http://schemas.openxmlformats.org/officeDocument/2006/relationships" xmlns:p="http://schemas.openxmlformats.org/presentationml/2006/main">
+  <p:cSld>
+    <p:spTree>
+      <p:nvGrpSpPr>
+        <p:cNvPr id="1" name=""/>
+        <p:cNvGrpSpPr/>
+        <p:nvPr/>
+      </p:nvGrpSpPr>
+      <p:grpSpPr>
+        <a:xfrm>
+          <a:off x="0" y="0"/>
+          <a:ext cx="0" cy="0"/>
+          <a:chOff x="0" y="0"/>
+          <a:chExt cx="0" cy="0"/>
+        </a:xfrm>
+      </p:grpSpPr>
+      <p:sp>
+        <p:nvSpPr>
+          <p:cNvPr id="4099" name="Rectangle 2"/>
+          <p:cNvSpPr>
+            <a:spLocks noGrp="1" noChangeArrowheads="1"/>
+          </p:cNvSpPr>
+          <p:nvPr>
+            <p:ph type="title"/>
+          </p:nvPr>
+        </p:nvSpPr>
+        <p:spPr/>
+        <p:txBody>
+          <a:bodyPr/>
+          <a:lstStyle/>
+          <a:p>
+            <a:r>
+              <a:rPr lang="en-US" dirty="0">
+                <a:latin typeface="+mn-lt"/>
+              </a:rPr>
+              <a:t>Joseph Reynolds</a:t>
+            </a:r>
+          </a:p>
+        </p:txBody>
+      </p:sp>
+      <p:sp>
+        <p:nvSpPr>
+          <p:cNvPr id="3" name="Footer Placeholder 2"/>
+          <p:cNvSpPr>
+            <a:spLocks noGrp="1"/>
+          </p:cNvSpPr>
+          <p:nvPr>
+            <p:ph type="ftr" sz="quarter" idx="11"/>
+          </p:nvPr>
+        </p:nvSpPr>
+        <p:spPr>
+          <a:xfrm>
+            <a:off x="1828800" y="6547104"/>
+            <a:ext cx="8531352" cy="274320"/>
+          </a:xfrm>
+        </p:spPr>
+        <p:txBody>
+          <a:bodyPr/>
+          <a:lstStyle/>
+          <a:p>
+            <a:r>
+              <a:rPr lang="en-US"/>
+              <a:t>Copyright © 2013 - 2019 by Mark Reynolds</a:t>
+            </a:r>
+          </a:p>
+        </p:txBody>
+      </p:sp>
+      <p:sp>
+        <p:nvSpPr>
+          <p:cNvPr id="4" name="Slide Number Placeholder 3"/>
+          <p:cNvSpPr>
+            <a:spLocks noGrp="1"/>
+          </p:cNvSpPr>
+          <p:nvPr>
+            <p:ph type="sldNum" sz="quarter" idx="12"/>
+          </p:nvPr>
+        </p:nvSpPr>
+        <p:spPr/>
+        <p:txBody>
+          <a:bodyPr/>
+          <a:lstStyle/>
+          <a:p>
+            <a:fld id="{6813DC8C-A616-47C4-99E2-1208BE02F915}" type="slidenum">
+              <a:rPr lang="en-US" smtClean="0"/>
+              <a:t>30</a:t>
+            </a:fld>
+            <a:endParaRPr lang="en-US"/>
+          </a:p>
+        </p:txBody>
+      </p:sp>
+      <p:sp>
+        <p:nvSpPr>
+          <p:cNvPr id="5" name="TextBox 4">
+            <a:extLst>
+              <a:ext uri="{FF2B5EF4-FFF2-40B4-BE49-F238E27FC236}">
+                <a16:creationId xmlns:a16="http://schemas.microsoft.com/office/drawing/2014/main" id="{FB5C5650-43A0-4263-9D37-5605A84FECA4}"/>
+              </a:ext>
+            </a:extLst>
+          </p:cNvPr>
+          <p:cNvSpPr txBox="1"/>
+          <p:nvPr/>
+        </p:nvSpPr>
+        <p:spPr>
+          <a:xfrm>
+            <a:off x="755780" y="1306286"/>
+            <a:ext cx="7585787" cy="1200329"/>
+          </a:xfrm>
+          <a:prstGeom prst="rect">
+            <a:avLst/>
+          </a:prstGeom>
+          <a:noFill/>
+        </p:spPr>
+        <p:txBody>
+          <a:bodyPr wrap="square" rtlCol="0">
+            <a:spAutoFit/>
+          </a:bodyPr>
+          <a:lstStyle/>
+          <a:p>
+            <a:pPr marL="285750" indent="-285750">
+              <a:buFont typeface="Arial" panose="020B0604020202020204" pitchFamily="34" charset="0"/>
+              <a:buChar char="•"/>
+            </a:pPr>
+            <a:r>
+              <a:rPr lang="en-US" dirty="0"/>
+              <a:t>EMAIL: </a:t>
+            </a:r>
+            <a:r>
+              <a:rPr lang="en-US" dirty="0">
+                <a:hlinkClick r:id="rId3"/>
+              </a:rPr>
+              <a:t>jreynolds@likeabosscoding.com</a:t>
+            </a:r>
+            <a:endParaRPr lang="en-US" dirty="0"/>
+          </a:p>
+          <a:p>
+            <a:pPr marL="285750" indent="-285750">
+              <a:buFont typeface="Arial" panose="020B0604020202020204" pitchFamily="34" charset="0"/>
+              <a:buChar char="•"/>
+            </a:pPr>
+            <a:r>
+              <a:rPr lang="en-US" dirty="0"/>
+              <a:t>Blog: </a:t>
+            </a:r>
+            <a:r>
+              <a:rPr lang="en-US" dirty="0">
+                <a:hlinkClick r:id="rId4"/>
+              </a:rPr>
+              <a:t>http://www.infocraft.net</a:t>
+            </a:r>
+            <a:endParaRPr lang="en-US" dirty="0"/>
+          </a:p>
+          <a:p>
+            <a:pPr marL="285750" indent="-285750">
+              <a:buFont typeface="Arial" panose="020B0604020202020204" pitchFamily="34" charset="0"/>
+              <a:buChar char="•"/>
+            </a:pPr>
+            <a:r>
+              <a:rPr lang="en-US" dirty="0"/>
+              <a:t>Github: </a:t>
+            </a:r>
+            <a:r>
+              <a:rPr lang="en-US" dirty="0">
+                <a:hlinkClick r:id="rId5"/>
+              </a:rPr>
+              <a:t>https://github.com/jmreynolds</a:t>
+            </a:r>
+            <a:endParaRPr lang="en-US" dirty="0"/>
+          </a:p>
+          <a:p>
+            <a:pPr marL="285750" indent="-285750">
+              <a:buFont typeface="Arial" panose="020B0604020202020204" pitchFamily="34" charset="0"/>
+              <a:buChar char="•"/>
+            </a:pPr>
+            <a:r>
+              <a:rPr lang="en-US" dirty="0"/>
+              <a:t>LinkedIn: </a:t>
+            </a:r>
+            <a:r>
+              <a:rPr lang="en-US" dirty="0">
+                <a:hlinkClick r:id="rId6"/>
+              </a:rPr>
+              <a:t>https://www.linkedin.com/in/josephreynolds/</a:t>
+            </a:r>
+            <a:endParaRPr lang="en-US" dirty="0"/>
+          </a:p>
+        </p:txBody>
+      </p:sp>
+    </p:spTree>
+    <p:extLst>
+      <p:ext uri="{BB962C8B-B14F-4D97-AF65-F5344CB8AC3E}">
+        <p14:creationId xmlns:p14="http://schemas.microsoft.com/office/powerpoint/2010/main" val="3856311636"/>
+      </p:ext>
+    </p:extLst>
+  </p:cSld>
+  <p:clrMapOvr>
+    <a:masterClrMapping/>
+  </p:clrMapOvr>
+  <mc:AlternateContent xmlns:mc="http://schemas.openxmlformats.org/markup-compatibility/2006" xmlns:p14="http://schemas.microsoft.com/office/powerpoint/2010/main">
+    <mc:Choice Requires="p14">
+      <p:transition spd="slow" p14:dur="1200">
+        <p14:prism/>
+      </p:transition>
+    </mc:Choice>
+    <mc:Fallback xmlns="">
+      <p:transition spd="slow">
+        <p:fade/>
+      </p:transition>
+    </mc:Fallback>
+  </mc:AlternateContent>
 </p:sld>
 </file>
 

</xml_diff>

<commit_message>
added .net core release
</commit_message>
<xml_diff>
--- a/Whats new in C#8.pptx
+++ b/Whats new in C#8.pptx
@@ -41557,6 +41557,20 @@
               <a:t>Entity Framework 6</a:t>
             </a:r>
           </a:p>
+          <a:p>
+            <a:r>
+              <a:rPr lang="en-US" dirty="0"/>
+              <a:t>Release (as of </a:t>
+            </a:r>
+            <a:r>
+              <a:rPr lang="en-US"/>
+              <a:t>this writing) </a:t>
+            </a:r>
+            <a:r>
+              <a:rPr lang="en-US" dirty="0"/>
+              <a:t>September 2019</a:t>
+            </a:r>
+          </a:p>
         </p:txBody>
       </p:sp>
       <p:sp>

</xml_diff>